<commit_message>
Modification GANTT + DIAPO
</commit_message>
<xml_diff>
--- a/LIVRABLE-1/Projet Madera.pptx
+++ b/LIVRABLE-1/Projet Madera.pptx
@@ -395,7 +395,7 @@
             <a:fld id="{B61BEF0D-F0BB-DE4B-95CE-6DB70DBA9567}" type="datetimeFigureOut">
               <a:rPr lang="en-US" smtClean="0"/>
               <a:pPr/>
-              <a:t>4/7/2019</a:t>
+              <a:t>4/10/2019</a:t>
             </a:fld>
             <a:endParaRPr lang="en-US" dirty="0"/>
           </a:p>
@@ -811,7 +811,7 @@
             <a:fld id="{B61BEF0D-F0BB-DE4B-95CE-6DB70DBA9567}" type="datetimeFigureOut">
               <a:rPr lang="en-US" smtClean="0"/>
               <a:pPr/>
-              <a:t>4/7/2019</a:t>
+              <a:t>4/10/2019</a:t>
             </a:fld>
             <a:endParaRPr lang="en-US" dirty="0"/>
           </a:p>
@@ -1149,7 +1149,7 @@
             <a:fld id="{B61BEF0D-F0BB-DE4B-95CE-6DB70DBA9567}" type="datetimeFigureOut">
               <a:rPr lang="en-US" smtClean="0"/>
               <a:pPr/>
-              <a:t>4/7/2019</a:t>
+              <a:t>4/10/2019</a:t>
             </a:fld>
             <a:endParaRPr lang="en-US" dirty="0"/>
           </a:p>
@@ -1556,7 +1556,7 @@
             <a:fld id="{B61BEF0D-F0BB-DE4B-95CE-6DB70DBA9567}" type="datetimeFigureOut">
               <a:rPr lang="en-US" smtClean="0"/>
               <a:pPr/>
-              <a:t>4/7/2019</a:t>
+              <a:t>4/10/2019</a:t>
             </a:fld>
             <a:endParaRPr lang="en-US" dirty="0"/>
           </a:p>
@@ -2126,7 +2126,7 @@
             <a:fld id="{B61BEF0D-F0BB-DE4B-95CE-6DB70DBA9567}" type="datetimeFigureOut">
               <a:rPr lang="en-US" smtClean="0"/>
               <a:pPr/>
-              <a:t>4/7/2019</a:t>
+              <a:t>4/10/2019</a:t>
             </a:fld>
             <a:endParaRPr lang="en-US" dirty="0"/>
           </a:p>
@@ -2809,7 +2809,7 @@
             <a:fld id="{B61BEF0D-F0BB-DE4B-95CE-6DB70DBA9567}" type="datetimeFigureOut">
               <a:rPr lang="en-US" smtClean="0"/>
               <a:pPr/>
-              <a:t>4/7/2019</a:t>
+              <a:t>4/10/2019</a:t>
             </a:fld>
             <a:endParaRPr lang="en-US" dirty="0"/>
           </a:p>
@@ -3724,7 +3724,7 @@
             <a:fld id="{B61BEF0D-F0BB-DE4B-95CE-6DB70DBA9567}" type="datetimeFigureOut">
               <a:rPr lang="en-US" smtClean="0"/>
               <a:pPr/>
-              <a:t>4/7/2019</a:t>
+              <a:t>4/10/2019</a:t>
             </a:fld>
             <a:endParaRPr lang="en-US" dirty="0"/>
           </a:p>
@@ -4039,7 +4039,7 @@
             <a:fld id="{B61BEF0D-F0BB-DE4B-95CE-6DB70DBA9567}" type="datetimeFigureOut">
               <a:rPr lang="en-US" smtClean="0"/>
               <a:pPr/>
-              <a:t>4/7/2019</a:t>
+              <a:t>4/10/2019</a:t>
             </a:fld>
             <a:endParaRPr lang="en-US" dirty="0"/>
           </a:p>
@@ -4305,7 +4305,7 @@
             <a:fld id="{B61BEF0D-F0BB-DE4B-95CE-6DB70DBA9567}" type="datetimeFigureOut">
               <a:rPr lang="en-US" smtClean="0"/>
               <a:pPr/>
-              <a:t>4/7/2019</a:t>
+              <a:t>4/10/2019</a:t>
             </a:fld>
             <a:endParaRPr lang="en-US" dirty="0"/>
           </a:p>
@@ -4630,7 +4630,7 @@
             <a:fld id="{B61BEF0D-F0BB-DE4B-95CE-6DB70DBA9567}" type="datetimeFigureOut">
               <a:rPr lang="en-US" smtClean="0"/>
               <a:pPr/>
-              <a:t>4/7/2019</a:t>
+              <a:t>4/10/2019</a:t>
             </a:fld>
             <a:endParaRPr lang="en-US" dirty="0"/>
           </a:p>
@@ -5021,7 +5021,7 @@
             <a:fld id="{B61BEF0D-F0BB-DE4B-95CE-6DB70DBA9567}" type="datetimeFigureOut">
               <a:rPr lang="en-US" smtClean="0"/>
               <a:pPr/>
-              <a:t>4/7/2019</a:t>
+              <a:t>4/10/2019</a:t>
             </a:fld>
             <a:endParaRPr lang="en-US" dirty="0"/>
           </a:p>
@@ -5399,7 +5399,7 @@
             <a:fld id="{B61BEF0D-F0BB-DE4B-95CE-6DB70DBA9567}" type="datetimeFigureOut">
               <a:rPr lang="en-US" smtClean="0"/>
               <a:pPr/>
-              <a:t>4/7/2019</a:t>
+              <a:t>4/10/2019</a:t>
             </a:fld>
             <a:endParaRPr lang="en-US" dirty="0"/>
           </a:p>
@@ -5907,7 +5907,7 @@
             <a:fld id="{B61BEF0D-F0BB-DE4B-95CE-6DB70DBA9567}" type="datetimeFigureOut">
               <a:rPr lang="en-US" smtClean="0"/>
               <a:pPr/>
-              <a:t>4/7/2019</a:t>
+              <a:t>4/10/2019</a:t>
             </a:fld>
             <a:endParaRPr lang="en-US" dirty="0"/>
           </a:p>
@@ -6166,7 +6166,7 @@
             <a:fld id="{B61BEF0D-F0BB-DE4B-95CE-6DB70DBA9567}" type="datetimeFigureOut">
               <a:rPr lang="en-US" smtClean="0"/>
               <a:pPr/>
-              <a:t>4/7/2019</a:t>
+              <a:t>4/10/2019</a:t>
             </a:fld>
             <a:endParaRPr lang="en-US" dirty="0"/>
           </a:p>
@@ -6331,7 +6331,7 @@
             <a:fld id="{B61BEF0D-F0BB-DE4B-95CE-6DB70DBA9567}" type="datetimeFigureOut">
               <a:rPr lang="en-US" smtClean="0"/>
               <a:pPr/>
-              <a:t>4/7/2019</a:t>
+              <a:t>4/10/2019</a:t>
             </a:fld>
             <a:endParaRPr lang="en-US" dirty="0"/>
           </a:p>
@@ -6723,7 +6723,7 @@
             <a:fld id="{B61BEF0D-F0BB-DE4B-95CE-6DB70DBA9567}" type="datetimeFigureOut">
               <a:rPr lang="en-US" smtClean="0"/>
               <a:pPr/>
-              <a:t>4/7/2019</a:t>
+              <a:t>4/10/2019</a:t>
             </a:fld>
             <a:endParaRPr lang="en-US" dirty="0"/>
           </a:p>
@@ -7134,7 +7134,7 @@
             <a:fld id="{B61BEF0D-F0BB-DE4B-95CE-6DB70DBA9567}" type="datetimeFigureOut">
               <a:rPr lang="en-US" smtClean="0"/>
               <a:pPr/>
-              <a:t>4/7/2019</a:t>
+              <a:t>4/10/2019</a:t>
             </a:fld>
             <a:endParaRPr lang="en-US" dirty="0"/>
           </a:p>
@@ -7380,7 +7380,7 @@
             <a:fld id="{B61BEF0D-F0BB-DE4B-95CE-6DB70DBA9567}" type="datetimeFigureOut">
               <a:rPr lang="en-US" smtClean="0"/>
               <a:pPr/>
-              <a:t>4/7/2019</a:t>
+              <a:t>4/10/2019</a:t>
             </a:fld>
             <a:endParaRPr lang="en-US" dirty="0"/>
           </a:p>
@@ -8657,45 +8657,61 @@
       </p:sp>
       <p:pic>
         <p:nvPicPr>
-          <p:cNvPr id="4" name="Espace réservé du contenu 3">
+          <p:cNvPr id="7" name="Espace réservé du contenu 6">
             <a:extLst>
               <a:ext uri="{FF2B5EF4-FFF2-40B4-BE49-F238E27FC236}">
-                <a16:creationId xmlns:a16="http://schemas.microsoft.com/office/drawing/2014/main" id="{0D8C0BA6-3BDC-4B93-889D-8123AC13DD80}"/>
+                <a16:creationId xmlns:a16="http://schemas.microsoft.com/office/drawing/2014/main" id="{5C26E003-7F5E-42E7-9611-E4C2512C75F3}"/>
               </a:ext>
             </a:extLst>
           </p:cNvPr>
           <p:cNvPicPr>
-            <a:picLocks noGrp="1"/>
+            <a:picLocks noGrp="1" noChangeAspect="1"/>
           </p:cNvPicPr>
           <p:nvPr>
             <p:ph idx="1"/>
           </p:nvPr>
         </p:nvPicPr>
         <p:blipFill>
-          <a:blip r:embed="rId2">
-            <a:extLst>
-              <a:ext uri="{28A0092B-C50C-407E-A947-70E740481C1C}">
-                <a14:useLocalDpi xmlns:a14="http://schemas.microsoft.com/office/drawing/2010/main" val="0"/>
-              </a:ext>
-            </a:extLst>
-          </a:blip>
-          <a:srcRect/>
+          <a:blip r:embed="rId2"/>
           <a:stretch>
             <a:fillRect/>
           </a:stretch>
         </p:blipFill>
-        <p:spPr bwMode="auto">
-          <a:xfrm>
-            <a:off x="123825" y="2552701"/>
-            <a:ext cx="11982449" cy="3676650"/>
+        <p:spPr>
+          <a:xfrm>
+            <a:off x="680321" y="2160188"/>
+            <a:ext cx="11102104" cy="2516588"/>
+          </a:xfrm>
+        </p:spPr>
+      </p:pic>
+      <p:pic>
+        <p:nvPicPr>
+          <p:cNvPr id="9" name="Image 8">
+            <a:extLst>
+              <a:ext uri="{FF2B5EF4-FFF2-40B4-BE49-F238E27FC236}">
+                <a16:creationId xmlns:a16="http://schemas.microsoft.com/office/drawing/2014/main" id="{4B95FBBC-58F7-4A35-BE20-02B9FEE49921}"/>
+              </a:ext>
+            </a:extLst>
+          </p:cNvPr>
+          <p:cNvPicPr>
+            <a:picLocks noChangeAspect="1"/>
+          </p:cNvPicPr>
+          <p:nvPr/>
+        </p:nvPicPr>
+        <p:blipFill>
+          <a:blip r:embed="rId3"/>
+          <a:stretch>
+            <a:fillRect/>
+          </a:stretch>
+        </p:blipFill>
+        <p:spPr>
+          <a:xfrm>
+            <a:off x="680321" y="3815242"/>
+            <a:ext cx="11102104" cy="2199315"/>
           </a:xfrm>
           <a:prstGeom prst="rect">
             <a:avLst/>
           </a:prstGeom>
-          <a:noFill/>
-          <a:ln>
-            <a:noFill/>
-          </a:ln>
         </p:spPr>
       </p:pic>
     </p:spTree>
@@ -8758,10 +8774,10 @@
       </p:sp>
       <p:pic>
         <p:nvPicPr>
-          <p:cNvPr id="9" name="Espace réservé du contenu 8">
+          <p:cNvPr id="6" name="Espace réservé du contenu 5">
             <a:extLst>
               <a:ext uri="{FF2B5EF4-FFF2-40B4-BE49-F238E27FC236}">
-                <a16:creationId xmlns:a16="http://schemas.microsoft.com/office/drawing/2014/main" id="{78297BC7-06ED-4BB2-A93C-905C0AF58B6C}"/>
+                <a16:creationId xmlns:a16="http://schemas.microsoft.com/office/drawing/2014/main" id="{EB7AD893-C922-458A-B672-48FD91620F85}"/>
               </a:ext>
             </a:extLst>
           </p:cNvPr>
@@ -8780,8 +8796,8 @@
         </p:blipFill>
         <p:spPr>
           <a:xfrm>
-            <a:off x="680321" y="2022475"/>
-            <a:ext cx="10328820" cy="4614942"/>
+            <a:off x="681038" y="2474716"/>
+            <a:ext cx="11034712" cy="3814133"/>
           </a:xfrm>
         </p:spPr>
       </p:pic>
@@ -8996,49 +9012,6 @@
           </a:p>
         </p:txBody>
       </p:sp>
-      <p:pic>
-        <p:nvPicPr>
-          <p:cNvPr id="4" name="Espace réservé du contenu 3">
-            <a:extLst>
-              <a:ext uri="{FF2B5EF4-FFF2-40B4-BE49-F238E27FC236}">
-                <a16:creationId xmlns:a16="http://schemas.microsoft.com/office/drawing/2014/main" id="{0C13EB97-FB86-4CB2-A110-1EA97183154B}"/>
-              </a:ext>
-            </a:extLst>
-          </p:cNvPr>
-          <p:cNvPicPr>
-            <a:picLocks noGrp="1"/>
-          </p:cNvPicPr>
-          <p:nvPr>
-            <p:ph idx="1"/>
-          </p:nvPr>
-        </p:nvPicPr>
-        <p:blipFill>
-          <a:blip r:embed="rId2" cstate="print">
-            <a:extLst>
-              <a:ext uri="{28A0092B-C50C-407E-A947-70E740481C1C}">
-                <a14:useLocalDpi xmlns:a14="http://schemas.microsoft.com/office/drawing/2010/main" val="0"/>
-              </a:ext>
-            </a:extLst>
-          </a:blip>
-          <a:srcRect/>
-          <a:stretch>
-            <a:fillRect/>
-          </a:stretch>
-        </p:blipFill>
-        <p:spPr bwMode="auto">
-          <a:xfrm>
-            <a:off x="790575" y="2886075"/>
-            <a:ext cx="7573755" cy="3467100"/>
-          </a:xfrm>
-          <a:prstGeom prst="rect">
-            <a:avLst/>
-          </a:prstGeom>
-          <a:noFill/>
-          <a:ln>
-            <a:noFill/>
-          </a:ln>
-        </p:spPr>
-      </p:pic>
       <p:sp>
         <p:nvSpPr>
           <p:cNvPr id="5" name="ZoneTexte 4">
@@ -9086,6 +9059,36 @@
               <a:t>Gestion des fichiers</a:t>
             </a:r>
           </a:p>
+          <a:p>
+            <a:endParaRPr lang="fr-FR" dirty="0"/>
+          </a:p>
+        </p:txBody>
+      </p:sp>
+      <p:sp>
+        <p:nvSpPr>
+          <p:cNvPr id="6" name="Espace réservé du contenu 5">
+            <a:extLst>
+              <a:ext uri="{FF2B5EF4-FFF2-40B4-BE49-F238E27FC236}">
+                <a16:creationId xmlns:a16="http://schemas.microsoft.com/office/drawing/2014/main" id="{F73F6C0D-3040-4984-B72B-B6FCD0E4E23A}"/>
+              </a:ext>
+            </a:extLst>
+          </p:cNvPr>
+          <p:cNvSpPr>
+            <a:spLocks noGrp="1"/>
+          </p:cNvSpPr>
+          <p:nvPr>
+            <p:ph idx="1"/>
+          </p:nvPr>
+        </p:nvSpPr>
+        <p:spPr>
+          <a:xfrm>
+            <a:off x="680321" y="2763001"/>
+            <a:ext cx="9613861" cy="3599316"/>
+          </a:xfrm>
+        </p:spPr>
+        <p:txBody>
+          <a:bodyPr/>
+          <a:lstStyle/>
           <a:p>
             <a:endParaRPr lang="fr-FR" dirty="0"/>
           </a:p>

</xml_diff>

<commit_message>
Modif diapo + spec pour gantt
</commit_message>
<xml_diff>
--- a/LIVRABLE-1/Projet Madera.pptx
+++ b/LIVRABLE-1/Projet Madera.pptx
@@ -9064,36 +9064,38 @@
           </a:p>
         </p:txBody>
       </p:sp>
-      <p:sp>
-        <p:nvSpPr>
-          <p:cNvPr id="6" name="Espace réservé du contenu 5">
+      <p:pic>
+        <p:nvPicPr>
+          <p:cNvPr id="7" name="Espace réservé du contenu 6">
             <a:extLst>
               <a:ext uri="{FF2B5EF4-FFF2-40B4-BE49-F238E27FC236}">
-                <a16:creationId xmlns:a16="http://schemas.microsoft.com/office/drawing/2014/main" id="{F73F6C0D-3040-4984-B72B-B6FCD0E4E23A}"/>
+                <a16:creationId xmlns:a16="http://schemas.microsoft.com/office/drawing/2014/main" id="{4A9C71D2-5FA8-40F2-958F-9258D42D78D9}"/>
               </a:ext>
             </a:extLst>
           </p:cNvPr>
-          <p:cNvSpPr>
-            <a:spLocks noGrp="1"/>
-          </p:cNvSpPr>
+          <p:cNvPicPr>
+            <a:picLocks noGrp="1"/>
+          </p:cNvPicPr>
           <p:nvPr>
             <p:ph idx="1"/>
           </p:nvPr>
-        </p:nvSpPr>
-        <p:spPr>
-          <a:xfrm>
-            <a:off x="680321" y="2763001"/>
-            <a:ext cx="9613861" cy="3599316"/>
-          </a:xfrm>
-        </p:spPr>
-        <p:txBody>
-          <a:bodyPr/>
-          <a:lstStyle/>
-          <a:p>
-            <a:endParaRPr lang="fr-FR" dirty="0"/>
-          </a:p>
-        </p:txBody>
-      </p:sp>
+        </p:nvPicPr>
+        <p:blipFill>
+          <a:blip r:embed="rId2"/>
+          <a:stretch>
+            <a:fillRect/>
+          </a:stretch>
+        </p:blipFill>
+        <p:spPr>
+          <a:xfrm>
+            <a:off x="2238375" y="2797761"/>
+            <a:ext cx="6389778" cy="3600450"/>
+          </a:xfrm>
+          <a:prstGeom prst="rect">
+            <a:avLst/>
+          </a:prstGeom>
+        </p:spPr>
+      </p:pic>
     </p:spTree>
     <p:extLst>
       <p:ext uri="{BB962C8B-B14F-4D97-AF65-F5344CB8AC3E}">

</xml_diff>

<commit_message>
Ajoute note wbs pptx
</commit_message>
<xml_diff>
--- a/LIVRABLE-1/Projet Madera.pptx
+++ b/LIVRABLE-1/Projet Madera.pptx
@@ -998,6 +998,367 @@
           <a:bodyPr/>
           <a:lstStyle/>
           <a:p>
+            <a:endParaRPr lang="fr-FR" dirty="0">
+              <a:effectLst/>
+            </a:endParaRPr>
+          </a:p>
+          <a:p>
+            <a:pPr lvl="1"/>
+            <a:r>
+              <a:rPr lang="fr-FR" sz="1200" kern="1200" dirty="0">
+                <a:solidFill>
+                  <a:schemeClr val="tx1"/>
+                </a:solidFill>
+                <a:effectLst/>
+                <a:latin typeface="+mn-lt"/>
+                <a:ea typeface="+mn-ea"/>
+                <a:cs typeface="+mn-cs"/>
+              </a:rPr>
+              <a:t>décomposition hiérarchique des travaux réalisés pour le livrable 1</a:t>
+            </a:r>
+          </a:p>
+          <a:p>
+            <a:br>
+              <a:rPr lang="fr-FR" sz="1200" kern="1200" dirty="0">
+                <a:solidFill>
+                  <a:schemeClr val="tx1"/>
+                </a:solidFill>
+                <a:effectLst/>
+                <a:latin typeface="+mn-lt"/>
+                <a:ea typeface="+mn-ea"/>
+                <a:cs typeface="+mn-cs"/>
+              </a:rPr>
+            </a:br>
+            <a:endParaRPr lang="fr-FR" sz="1200" kern="1200" dirty="0">
+              <a:solidFill>
+                <a:schemeClr val="tx1"/>
+              </a:solidFill>
+              <a:effectLst/>
+              <a:latin typeface="+mn-lt"/>
+              <a:ea typeface="+mn-ea"/>
+              <a:cs typeface="+mn-cs"/>
+            </a:endParaRPr>
+          </a:p>
+          <a:p>
+            <a:pPr lvl="1"/>
+            <a:r>
+              <a:rPr lang="fr-FR" sz="1200" b="1" u="sng" kern="1200" dirty="0">
+                <a:solidFill>
+                  <a:schemeClr val="tx1"/>
+                </a:solidFill>
+                <a:effectLst/>
+                <a:latin typeface="+mn-lt"/>
+                <a:ea typeface="+mn-ea"/>
+                <a:cs typeface="+mn-cs"/>
+              </a:rPr>
+              <a:t>Lancement de projet : Préparation du projet </a:t>
+            </a:r>
+            <a:endParaRPr lang="fr-FR" sz="1200" kern="1200" dirty="0">
+              <a:solidFill>
+                <a:schemeClr val="tx1"/>
+              </a:solidFill>
+              <a:effectLst/>
+              <a:latin typeface="+mn-lt"/>
+              <a:ea typeface="+mn-ea"/>
+              <a:cs typeface="+mn-cs"/>
+            </a:endParaRPr>
+          </a:p>
+          <a:p>
+            <a:pPr lvl="2"/>
+            <a:r>
+              <a:rPr lang="fr-FR" sz="1200" kern="1200" dirty="0">
+                <a:solidFill>
+                  <a:schemeClr val="tx1"/>
+                </a:solidFill>
+                <a:effectLst/>
+                <a:latin typeface="+mn-lt"/>
+                <a:ea typeface="+mn-ea"/>
+                <a:cs typeface="+mn-cs"/>
+              </a:rPr>
+              <a:t>Analyse du sujet : Étude des besoins initiaux du client</a:t>
+            </a:r>
+          </a:p>
+          <a:p>
+            <a:pPr lvl="2"/>
+            <a:r>
+              <a:rPr lang="fr-FR" sz="1200" kern="1200" dirty="0">
+                <a:solidFill>
+                  <a:schemeClr val="tx1"/>
+                </a:solidFill>
+                <a:effectLst/>
+                <a:latin typeface="+mn-lt"/>
+                <a:ea typeface="+mn-ea"/>
+                <a:cs typeface="+mn-cs"/>
+              </a:rPr>
+              <a:t>Reformulation du besoin : Redéfinition des besoins techniques du projet</a:t>
+            </a:r>
+          </a:p>
+          <a:p>
+            <a:pPr lvl="2"/>
+            <a:r>
+              <a:rPr lang="fr-FR" sz="1200" kern="1200" dirty="0">
+                <a:solidFill>
+                  <a:schemeClr val="tx1"/>
+                </a:solidFill>
+                <a:effectLst/>
+                <a:latin typeface="+mn-lt"/>
+                <a:ea typeface="+mn-ea"/>
+                <a:cs typeface="+mn-cs"/>
+              </a:rPr>
+              <a:t>Note de cadrage : Présentation d’une solution temporaire au client -&gt; préparation analyse fonctionnel</a:t>
+            </a:r>
+          </a:p>
+          <a:p>
+            <a:br>
+              <a:rPr lang="fr-FR" sz="1200" kern="1200" dirty="0">
+                <a:solidFill>
+                  <a:schemeClr val="tx1"/>
+                </a:solidFill>
+                <a:effectLst/>
+                <a:latin typeface="+mn-lt"/>
+                <a:ea typeface="+mn-ea"/>
+                <a:cs typeface="+mn-cs"/>
+              </a:rPr>
+            </a:br>
+            <a:endParaRPr lang="fr-FR" sz="1200" kern="1200" dirty="0">
+              <a:solidFill>
+                <a:schemeClr val="tx1"/>
+              </a:solidFill>
+              <a:effectLst/>
+              <a:latin typeface="+mn-lt"/>
+              <a:ea typeface="+mn-ea"/>
+              <a:cs typeface="+mn-cs"/>
+            </a:endParaRPr>
+          </a:p>
+          <a:p>
+            <a:pPr lvl="1"/>
+            <a:r>
+              <a:rPr lang="fr-FR" sz="1200" b="1" u="sng" kern="1200" dirty="0">
+                <a:solidFill>
+                  <a:schemeClr val="tx1"/>
+                </a:solidFill>
+                <a:effectLst/>
+                <a:latin typeface="+mn-lt"/>
+                <a:ea typeface="+mn-ea"/>
+                <a:cs typeface="+mn-cs"/>
+              </a:rPr>
+              <a:t>Analyse fonctionnel : Mise en place du premier livrable</a:t>
+            </a:r>
+            <a:endParaRPr lang="fr-FR" sz="1200" kern="1200" dirty="0">
+              <a:solidFill>
+                <a:schemeClr val="tx1"/>
+              </a:solidFill>
+              <a:effectLst/>
+              <a:latin typeface="+mn-lt"/>
+              <a:ea typeface="+mn-ea"/>
+              <a:cs typeface="+mn-cs"/>
+            </a:endParaRPr>
+          </a:p>
+          <a:p>
+            <a:pPr lvl="2"/>
+            <a:r>
+              <a:rPr lang="fr-FR" sz="1200" kern="1200" dirty="0">
+                <a:solidFill>
+                  <a:schemeClr val="tx1"/>
+                </a:solidFill>
+                <a:effectLst/>
+                <a:latin typeface="+mn-lt"/>
+                <a:ea typeface="+mn-ea"/>
+                <a:cs typeface="+mn-cs"/>
+              </a:rPr>
+              <a:t>Création planning prévisionnel </a:t>
+            </a:r>
+          </a:p>
+          <a:p>
+            <a:pPr lvl="2"/>
+            <a:r>
+              <a:rPr lang="fr-FR" sz="1200" kern="1200" dirty="0">
+                <a:solidFill>
+                  <a:schemeClr val="tx1"/>
+                </a:solidFill>
+                <a:effectLst/>
+                <a:latin typeface="+mn-lt"/>
+                <a:ea typeface="+mn-ea"/>
+                <a:cs typeface="+mn-cs"/>
+              </a:rPr>
+              <a:t>Gestion système documentaire : Tri des différents documents </a:t>
+            </a:r>
+          </a:p>
+          <a:p>
+            <a:pPr lvl="2"/>
+            <a:r>
+              <a:rPr lang="fr-FR" sz="1200" kern="1200" dirty="0">
+                <a:solidFill>
+                  <a:schemeClr val="tx1"/>
+                </a:solidFill>
+                <a:effectLst/>
+                <a:latin typeface="+mn-lt"/>
+                <a:ea typeface="+mn-ea"/>
+                <a:cs typeface="+mn-cs"/>
+              </a:rPr>
+              <a:t>Découpage et hiérarchisation des fonctions : méthode agile (romain)</a:t>
+            </a:r>
+          </a:p>
+          <a:p>
+            <a:pPr lvl="2"/>
+            <a:r>
+              <a:rPr lang="fr-FR" sz="1200" kern="1200" dirty="0">
+                <a:solidFill>
+                  <a:schemeClr val="tx1"/>
+                </a:solidFill>
+                <a:effectLst/>
+                <a:latin typeface="+mn-lt"/>
+                <a:ea typeface="+mn-ea"/>
+                <a:cs typeface="+mn-cs"/>
+              </a:rPr>
+              <a:t>Grille d’analyse des risques : SWOT -&gt; forces, faiblesses, opportunités, menaces</a:t>
+            </a:r>
+          </a:p>
+          <a:p>
+            <a:pPr lvl="2"/>
+            <a:r>
+              <a:rPr lang="fr-FR" sz="1200" kern="1200" dirty="0">
+                <a:solidFill>
+                  <a:schemeClr val="tx1"/>
+                </a:solidFill>
+                <a:effectLst/>
+                <a:latin typeface="+mn-lt"/>
+                <a:ea typeface="+mn-ea"/>
+                <a:cs typeface="+mn-cs"/>
+              </a:rPr>
+              <a:t>Structure de l’équipe et rôles : méthode agile (romain)</a:t>
+            </a:r>
+          </a:p>
+          <a:p>
+            <a:pPr lvl="2"/>
+            <a:r>
+              <a:rPr lang="fr-FR" sz="1200" kern="1200" dirty="0">
+                <a:solidFill>
+                  <a:schemeClr val="tx1"/>
+                </a:solidFill>
+                <a:effectLst/>
+                <a:latin typeface="+mn-lt"/>
+                <a:ea typeface="+mn-ea"/>
+                <a:cs typeface="+mn-cs"/>
+              </a:rPr>
+              <a:t>Diagramme de cas d’utilisation </a:t>
+            </a:r>
+          </a:p>
+          <a:p>
+            <a:pPr lvl="2"/>
+            <a:r>
+              <a:rPr lang="fr-FR" sz="1200" kern="1200" dirty="0">
+                <a:solidFill>
+                  <a:schemeClr val="tx1"/>
+                </a:solidFill>
+                <a:effectLst/>
+                <a:latin typeface="+mn-lt"/>
+                <a:ea typeface="+mn-ea"/>
+                <a:cs typeface="+mn-cs"/>
+              </a:rPr>
+              <a:t>WBS</a:t>
+            </a:r>
+          </a:p>
+          <a:p>
+            <a:pPr lvl="2"/>
+            <a:r>
+              <a:rPr lang="fr-FR" sz="1200" kern="1200">
+                <a:solidFill>
+                  <a:schemeClr val="tx1"/>
+                </a:solidFill>
+                <a:effectLst/>
+                <a:latin typeface="+mn-lt"/>
+                <a:ea typeface="+mn-ea"/>
+                <a:cs typeface="+mn-cs"/>
+              </a:rPr>
+              <a:t>PBS : Description des différentes fonctions de la solution </a:t>
+            </a:r>
+          </a:p>
+          <a:p>
+            <a:endParaRPr lang="fr-FR"/>
+          </a:p>
+        </p:txBody>
+      </p:sp>
+      <p:sp>
+        <p:nvSpPr>
+          <p:cNvPr id="4" name="Espace réservé du numéro de diapositive 3"/>
+          <p:cNvSpPr>
+            <a:spLocks noGrp="1"/>
+          </p:cNvSpPr>
+          <p:nvPr>
+            <p:ph type="sldNum" sz="quarter" idx="5"/>
+          </p:nvPr>
+        </p:nvSpPr>
+        <p:spPr/>
+        <p:txBody>
+          <a:bodyPr/>
+          <a:lstStyle/>
+          <a:p>
+            <a:fld id="{A4398319-E21C-4226-9771-24912F5B4C11}" type="slidenum">
+              <a:rPr lang="fr-FR" smtClean="0"/>
+              <a:t>6</a:t>
+            </a:fld>
+            <a:endParaRPr lang="fr-FR"/>
+          </a:p>
+        </p:txBody>
+      </p:sp>
+    </p:spTree>
+    <p:extLst>
+      <p:ext uri="{BB962C8B-B14F-4D97-AF65-F5344CB8AC3E}">
+        <p14:creationId xmlns:p14="http://schemas.microsoft.com/office/powerpoint/2010/main" val="1367831788"/>
+      </p:ext>
+    </p:extLst>
+  </p:cSld>
+  <p:clrMapOvr>
+    <a:masterClrMapping/>
+  </p:clrMapOvr>
+</p:notes>
+</file>
+
+<file path=ppt/notesSlides/notesSlide6.xml><?xml version="1.0" encoding="utf-8"?>
+<p:notes xmlns:a="http://schemas.openxmlformats.org/drawingml/2006/main" xmlns:r="http://schemas.openxmlformats.org/officeDocument/2006/relationships" xmlns:p="http://schemas.openxmlformats.org/presentationml/2006/main">
+  <p:cSld>
+    <p:spTree>
+      <p:nvGrpSpPr>
+        <p:cNvPr id="1" name=""/>
+        <p:cNvGrpSpPr/>
+        <p:nvPr/>
+      </p:nvGrpSpPr>
+      <p:grpSpPr>
+        <a:xfrm>
+          <a:off x="0" y="0"/>
+          <a:ext cx="0" cy="0"/>
+          <a:chOff x="0" y="0"/>
+          <a:chExt cx="0" cy="0"/>
+        </a:xfrm>
+      </p:grpSpPr>
+      <p:sp>
+        <p:nvSpPr>
+          <p:cNvPr id="2" name="Espace réservé de l'image des diapositives 1"/>
+          <p:cNvSpPr>
+            <a:spLocks noGrp="1" noRot="1" noChangeAspect="1"/>
+          </p:cNvSpPr>
+          <p:nvPr>
+            <p:ph type="sldImg"/>
+          </p:nvPr>
+        </p:nvSpPr>
+        <p:spPr/>
+      </p:sp>
+      <p:sp>
+        <p:nvSpPr>
+          <p:cNvPr id="3" name="Espace réservé des notes 2"/>
+          <p:cNvSpPr>
+            <a:spLocks noGrp="1"/>
+          </p:cNvSpPr>
+          <p:nvPr>
+            <p:ph type="body" idx="1"/>
+          </p:nvPr>
+        </p:nvSpPr>
+        <p:spPr/>
+        <p:txBody>
+          <a:bodyPr/>
+          <a:lstStyle/>
+          <a:p>
             <a:r>
               <a:rPr lang="fr-FR" dirty="0"/>
               <a:t>Explication SWOT : </a:t>
@@ -1141,7 +1502,7 @@
 </p:notes>
 </file>
 
-<file path=ppt/notesSlides/notesSlide6.xml><?xml version="1.0" encoding="utf-8"?>
+<file path=ppt/notesSlides/notesSlide7.xml><?xml version="1.0" encoding="utf-8"?>
 <p:notes xmlns:a="http://schemas.openxmlformats.org/drawingml/2006/main" xmlns:r="http://schemas.openxmlformats.org/officeDocument/2006/relationships" xmlns:p="http://schemas.openxmlformats.org/presentationml/2006/main">
   <p:cSld>
     <p:spTree>
@@ -1500,7 +1861,7 @@
             <a:fld id="{B61BEF0D-F0BB-DE4B-95CE-6DB70DBA9567}" type="datetimeFigureOut">
               <a:rPr lang="en-US" smtClean="0"/>
               <a:pPr/>
-              <a:t>4/12/2019</a:t>
+              <a:t>4/12/19</a:t>
             </a:fld>
             <a:endParaRPr lang="en-US" dirty="0"/>
           </a:p>
@@ -1916,7 +2277,7 @@
             <a:fld id="{B61BEF0D-F0BB-DE4B-95CE-6DB70DBA9567}" type="datetimeFigureOut">
               <a:rPr lang="en-US" smtClean="0"/>
               <a:pPr/>
-              <a:t>4/12/2019</a:t>
+              <a:t>4/12/19</a:t>
             </a:fld>
             <a:endParaRPr lang="en-US" dirty="0"/>
           </a:p>
@@ -2254,7 +2615,7 @@
             <a:fld id="{B61BEF0D-F0BB-DE4B-95CE-6DB70DBA9567}" type="datetimeFigureOut">
               <a:rPr lang="en-US" smtClean="0"/>
               <a:pPr/>
-              <a:t>4/12/2019</a:t>
+              <a:t>4/12/19</a:t>
             </a:fld>
             <a:endParaRPr lang="en-US" dirty="0"/>
           </a:p>
@@ -2661,7 +3022,7 @@
             <a:fld id="{B61BEF0D-F0BB-DE4B-95CE-6DB70DBA9567}" type="datetimeFigureOut">
               <a:rPr lang="en-US" smtClean="0"/>
               <a:pPr/>
-              <a:t>4/12/2019</a:t>
+              <a:t>4/12/19</a:t>
             </a:fld>
             <a:endParaRPr lang="en-US" dirty="0"/>
           </a:p>
@@ -3231,7 +3592,7 @@
             <a:fld id="{B61BEF0D-F0BB-DE4B-95CE-6DB70DBA9567}" type="datetimeFigureOut">
               <a:rPr lang="en-US" smtClean="0"/>
               <a:pPr/>
-              <a:t>4/12/2019</a:t>
+              <a:t>4/12/19</a:t>
             </a:fld>
             <a:endParaRPr lang="en-US" dirty="0"/>
           </a:p>
@@ -3914,7 +4275,7 @@
             <a:fld id="{B61BEF0D-F0BB-DE4B-95CE-6DB70DBA9567}" type="datetimeFigureOut">
               <a:rPr lang="en-US" smtClean="0"/>
               <a:pPr/>
-              <a:t>4/12/2019</a:t>
+              <a:t>4/12/19</a:t>
             </a:fld>
             <a:endParaRPr lang="en-US" dirty="0"/>
           </a:p>
@@ -4829,7 +5190,7 @@
             <a:fld id="{B61BEF0D-F0BB-DE4B-95CE-6DB70DBA9567}" type="datetimeFigureOut">
               <a:rPr lang="en-US" smtClean="0"/>
               <a:pPr/>
-              <a:t>4/12/2019</a:t>
+              <a:t>4/12/19</a:t>
             </a:fld>
             <a:endParaRPr lang="en-US" dirty="0"/>
           </a:p>
@@ -5144,7 +5505,7 @@
             <a:fld id="{B61BEF0D-F0BB-DE4B-95CE-6DB70DBA9567}" type="datetimeFigureOut">
               <a:rPr lang="en-US" smtClean="0"/>
               <a:pPr/>
-              <a:t>4/12/2019</a:t>
+              <a:t>4/12/19</a:t>
             </a:fld>
             <a:endParaRPr lang="en-US" dirty="0"/>
           </a:p>
@@ -5410,7 +5771,7 @@
             <a:fld id="{B61BEF0D-F0BB-DE4B-95CE-6DB70DBA9567}" type="datetimeFigureOut">
               <a:rPr lang="en-US" smtClean="0"/>
               <a:pPr/>
-              <a:t>4/12/2019</a:t>
+              <a:t>4/12/19</a:t>
             </a:fld>
             <a:endParaRPr lang="en-US" dirty="0"/>
           </a:p>
@@ -5735,7 +6096,7 @@
             <a:fld id="{B61BEF0D-F0BB-DE4B-95CE-6DB70DBA9567}" type="datetimeFigureOut">
               <a:rPr lang="en-US" smtClean="0"/>
               <a:pPr/>
-              <a:t>4/12/2019</a:t>
+              <a:t>4/12/19</a:t>
             </a:fld>
             <a:endParaRPr lang="en-US" dirty="0"/>
           </a:p>
@@ -6126,7 +6487,7 @@
             <a:fld id="{B61BEF0D-F0BB-DE4B-95CE-6DB70DBA9567}" type="datetimeFigureOut">
               <a:rPr lang="en-US" smtClean="0"/>
               <a:pPr/>
-              <a:t>4/12/2019</a:t>
+              <a:t>4/12/19</a:t>
             </a:fld>
             <a:endParaRPr lang="en-US" dirty="0"/>
           </a:p>
@@ -6504,7 +6865,7 @@
             <a:fld id="{B61BEF0D-F0BB-DE4B-95CE-6DB70DBA9567}" type="datetimeFigureOut">
               <a:rPr lang="en-US" smtClean="0"/>
               <a:pPr/>
-              <a:t>4/12/2019</a:t>
+              <a:t>4/12/19</a:t>
             </a:fld>
             <a:endParaRPr lang="en-US" dirty="0"/>
           </a:p>
@@ -7012,7 +7373,7 @@
             <a:fld id="{B61BEF0D-F0BB-DE4B-95CE-6DB70DBA9567}" type="datetimeFigureOut">
               <a:rPr lang="en-US" smtClean="0"/>
               <a:pPr/>
-              <a:t>4/12/2019</a:t>
+              <a:t>4/12/19</a:t>
             </a:fld>
             <a:endParaRPr lang="en-US" dirty="0"/>
           </a:p>
@@ -7271,7 +7632,7 @@
             <a:fld id="{B61BEF0D-F0BB-DE4B-95CE-6DB70DBA9567}" type="datetimeFigureOut">
               <a:rPr lang="en-US" smtClean="0"/>
               <a:pPr/>
-              <a:t>4/12/2019</a:t>
+              <a:t>4/12/19</a:t>
             </a:fld>
             <a:endParaRPr lang="en-US" dirty="0"/>
           </a:p>
@@ -7436,7 +7797,7 @@
             <a:fld id="{B61BEF0D-F0BB-DE4B-95CE-6DB70DBA9567}" type="datetimeFigureOut">
               <a:rPr lang="en-US" smtClean="0"/>
               <a:pPr/>
-              <a:t>4/12/2019</a:t>
+              <a:t>4/12/19</a:t>
             </a:fld>
             <a:endParaRPr lang="en-US" dirty="0"/>
           </a:p>
@@ -7828,7 +8189,7 @@
             <a:fld id="{B61BEF0D-F0BB-DE4B-95CE-6DB70DBA9567}" type="datetimeFigureOut">
               <a:rPr lang="en-US" smtClean="0"/>
               <a:pPr/>
-              <a:t>4/12/2019</a:t>
+              <a:t>4/12/19</a:t>
             </a:fld>
             <a:endParaRPr lang="en-US" dirty="0"/>
           </a:p>
@@ -8239,7 +8600,7 @@
             <a:fld id="{B61BEF0D-F0BB-DE4B-95CE-6DB70DBA9567}" type="datetimeFigureOut">
               <a:rPr lang="en-US" smtClean="0"/>
               <a:pPr/>
-              <a:t>4/12/2019</a:t>
+              <a:t>4/12/19</a:t>
             </a:fld>
             <a:endParaRPr lang="en-US" dirty="0"/>
           </a:p>
@@ -8485,7 +8846,7 @@
             <a:fld id="{B61BEF0D-F0BB-DE4B-95CE-6DB70DBA9567}" type="datetimeFigureOut">
               <a:rPr lang="en-US" smtClean="0"/>
               <a:pPr/>
-              <a:t>4/12/2019</a:t>
+              <a:t>4/12/19</a:t>
             </a:fld>
             <a:endParaRPr lang="en-US" dirty="0"/>
           </a:p>
@@ -10771,7 +11132,7 @@
           </p:nvPr>
         </p:nvPicPr>
         <p:blipFill>
-          <a:blip r:embed="rId2"/>
+          <a:blip r:embed="rId3"/>
           <a:stretch>
             <a:fillRect/>
           </a:stretch>

</xml_diff>

<commit_message>
Correction wbs spec et pptx
</commit_message>
<xml_diff>
--- a/LIVRABLE-1/Projet Madera.pptx
+++ b/LIVRABLE-1/Projet Madera.pptx
@@ -1262,7 +1262,7 @@
           <a:p>
             <a:pPr lvl="2"/>
             <a:r>
-              <a:rPr lang="fr-FR" sz="1200" kern="1200">
+              <a:rPr lang="fr-FR" sz="1200" kern="1200" dirty="0">
                 <a:solidFill>
                   <a:schemeClr val="tx1"/>
                 </a:solidFill>
@@ -1275,7 +1275,7 @@
             </a:r>
           </a:p>
           <a:p>
-            <a:endParaRPr lang="fr-FR"/>
+            <a:endParaRPr lang="fr-FR" dirty="0"/>
           </a:p>
         </p:txBody>
       </p:sp>
@@ -11117,19 +11117,17 @@
       </p:sp>
       <p:pic>
         <p:nvPicPr>
-          <p:cNvPr id="6" name="Espace réservé du contenu 5">
+          <p:cNvPr id="4" name="Image 3" descr="Une image contenant capture d’écran&#10;&#10;Description générée automatiquement">
             <a:extLst>
               <a:ext uri="{FF2B5EF4-FFF2-40B4-BE49-F238E27FC236}">
-                <a16:creationId xmlns:a16="http://schemas.microsoft.com/office/drawing/2014/main" id="{EB7AD893-C922-458A-B672-48FD91620F85}"/>
+                <a16:creationId xmlns:a16="http://schemas.microsoft.com/office/drawing/2014/main" id="{1112B80E-4443-0C49-9E5F-A408774139F1}"/>
               </a:ext>
             </a:extLst>
           </p:cNvPr>
           <p:cNvPicPr>
-            <a:picLocks noGrp="1" noChangeAspect="1"/>
+            <a:picLocks noChangeAspect="1"/>
           </p:cNvPicPr>
-          <p:nvPr>
-            <p:ph idx="1"/>
-          </p:nvPr>
+          <p:nvPr/>
         </p:nvPicPr>
         <p:blipFill>
           <a:blip r:embed="rId3"/>
@@ -11139,9 +11137,12 @@
         </p:blipFill>
         <p:spPr>
           <a:xfrm>
-            <a:off x="681038" y="2474716"/>
-            <a:ext cx="11034712" cy="3814133"/>
-          </a:xfrm>
+            <a:off x="585910" y="2343826"/>
+            <a:ext cx="11020180" cy="3592363"/>
+          </a:xfrm>
+          <a:prstGeom prst="rect">
+            <a:avLst/>
+          </a:prstGeom>
         </p:spPr>
       </p:pic>
     </p:spTree>

</xml_diff>